<commit_message>
start working on tilting
</commit_message>
<xml_diff>
--- a/Presentation.pptx
+++ b/Presentation.pptx
@@ -238,7 +238,7 @@
           <a:p>
             <a:fld id="{CF93AEB5-C303-4762-90A0-AF697EB357C4}" type="datetimeFigureOut">
               <a:rPr lang="de-DE" smtClean="0"/>
-              <a:t>09.11.2025</a:t>
+              <a:t>11.11.25</a:t>
             </a:fld>
             <a:endParaRPr lang="de-DE"/>
           </a:p>
@@ -20391,6 +20391,13 @@
           </a:p>
           <a:p>
             <a:pPr lvl="1"/>
+            <a:r>
+              <a:rPr lang="en-GB" dirty="0"/>
+              <a:t>When faces are far away</a:t>
+            </a:r>
+          </a:p>
+          <a:p>
+            <a:pPr lvl="1"/>
             <a:endParaRPr lang="en-GB" dirty="0"/>
           </a:p>
           <a:p>
@@ -20516,8 +20523,12 @@
           <a:lstStyle/>
           <a:p>
             <a:r>
+              <a:rPr lang="en-US" noProof="0" dirty="0"/>
+              <a:t>Campus </a:t>
+            </a:r>
+            <a:r>
               <a:rPr lang="en-US" noProof="0"/>
-              <a:t>Campus Sontheim</a:t>
+              <a:t>Sontheim</a:t>
             </a:r>
             <a:endParaRPr lang="en-GB" noProof="0" dirty="0"/>
           </a:p>

</xml_diff>